<commit_message>
added description in README.md
</commit_message>
<xml_diff>
--- a/Stinger Team Presentation.pptx
+++ b/Stinger Team Presentation.pptx
@@ -3884,7 +3884,7 @@
         </p:nvSpPr>
         <p:spPr>
           <a:xfrm>
-            <a:off x="611560" y="332656"/>
+            <a:off x="323528" y="332656"/>
             <a:ext cx="7851648" cy="2592288"/>
           </a:xfrm>
           <a:prstGeom prst="rect">
@@ -3962,7 +3962,7 @@
         </p:nvSpPr>
         <p:spPr>
           <a:xfrm>
-            <a:off x="539552" y="4221088"/>
+            <a:off x="467544" y="4293096"/>
             <a:ext cx="7854696" cy="1752600"/>
           </a:xfrm>
           <a:prstGeom prst="rect">
@@ -4228,7 +4228,7 @@
         </p:nvSpPr>
         <p:spPr>
           <a:xfrm>
-            <a:off x="467544" y="2852936"/>
+            <a:off x="251520" y="2780928"/>
             <a:ext cx="7854696" cy="1752600"/>
           </a:xfrm>
           <a:prstGeom prst="rect">
@@ -4337,7 +4337,7 @@
         </p:blipFill>
         <p:spPr bwMode="auto">
           <a:xfrm>
-            <a:off x="7092280" y="2636912"/>
+            <a:off x="7092280" y="2564904"/>
             <a:ext cx="1790700" cy="1828800"/>
           </a:xfrm>
           <a:prstGeom prst="rect">
@@ -4396,19 +4396,7 @@
               <a:rPr lang="en-US" b="1" i="1" dirty="0" smtClean="0">
                 <a:latin typeface="+mn-lt"/>
               </a:rPr>
-              <a:t>Stinger</a:t>
-            </a:r>
-            <a:r>
-              <a:rPr lang="en-US" b="1" i="1" dirty="0" smtClean="0">
-                <a:latin typeface="+mn-lt"/>
-              </a:rPr>
-              <a:t> </a:t>
-            </a:r>
-            <a:r>
-              <a:rPr lang="en-US" b="1" i="1" dirty="0" smtClean="0">
-                <a:latin typeface="+mn-lt"/>
-              </a:rPr>
-              <a:t>Team</a:t>
+              <a:t>Stinger Team</a:t>
             </a:r>
             <a:endParaRPr lang="bg-BG" b="1" i="1" dirty="0">
               <a:latin typeface="+mn-lt"/>
@@ -4793,7 +4781,7 @@
         </p:nvSpPr>
         <p:spPr>
           <a:xfrm>
-            <a:off x="323528" y="1412776"/>
+            <a:off x="323528" y="1484784"/>
             <a:ext cx="1944216" cy="369332"/>
           </a:xfrm>
           <a:prstGeom prst="rect">
@@ -4980,7 +4968,7 @@
         </p:nvSpPr>
         <p:spPr>
           <a:xfrm>
-            <a:off x="1403648" y="4221088"/>
+            <a:off x="1331640" y="4221088"/>
             <a:ext cx="1728192" cy="369332"/>
           </a:xfrm>
           <a:prstGeom prst="rect">

</xml_diff>